<commit_message>
Added "instructions" on pptx template.
</commit_message>
<xml_diff>
--- a/pptx/presentacion43.pptx
+++ b/pptx/presentacion43.pptx
@@ -1900,17 +1900,7 @@
                 <a:latin typeface="Arial"/>
                 <a:cs typeface="Arial"/>
               </a:rPr>
-              <a:t>T</a:t>
-            </a:r>
-            <a:r>
-              <a:rPr lang="es-ES" sz="1400" b="1" spc="120" dirty="0" smtClean="0">
-                <a:solidFill>
-                  <a:srgbClr val="505050"/>
-                </a:solidFill>
-                <a:latin typeface="Arial"/>
-                <a:cs typeface="Arial"/>
-              </a:rPr>
-              <a:t>ítulo</a:t>
+              <a:t>Título</a:t>
             </a:r>
             <a:endParaRPr sz="1400" dirty="0">
               <a:latin typeface="Arial"/>
@@ -1934,17 +1924,7 @@
                 <a:latin typeface="Arial"/>
                 <a:cs typeface="Arial"/>
               </a:rPr>
-              <a:t>Subt</a:t>
-            </a:r>
-            <a:r>
-              <a:rPr lang="es-ES" sz="1100" b="1" spc="-60" dirty="0" smtClean="0">
-                <a:solidFill>
-                  <a:srgbClr val="505050"/>
-                </a:solidFill>
-                <a:latin typeface="Arial"/>
-                <a:cs typeface="Arial"/>
-              </a:rPr>
-              <a:t>ítulo</a:t>
+              <a:t>Subtítulo</a:t>
             </a:r>
             <a:endParaRPr sz="1100" dirty="0">
               <a:latin typeface="Arial"/>
@@ -2415,7 +2395,7 @@
                 <a:ea typeface="Tahoma" charset="0"/>
                 <a:cs typeface="Tahoma" charset="0"/>
               </a:rPr>
-              <a:t>Texto</a:t>
+              <a:t>Usa</a:t>
             </a:r>
             <a:r>
               <a:rPr lang="en-US" sz="1100" dirty="0" smtClean="0">
@@ -2426,7 +2406,7 @@
                 <a:ea typeface="Tahoma" charset="0"/>
                 <a:cs typeface="Tahoma" charset="0"/>
               </a:rPr>
-              <a:t> </a:t>
+              <a:t> la </a:t>
             </a:r>
             <a:r>
               <a:rPr lang="en-US" sz="1100" dirty="0" err="1" smtClean="0">
@@ -2437,7 +2417,29 @@
                 <a:ea typeface="Tahoma" charset="0"/>
                 <a:cs typeface="Tahoma" charset="0"/>
               </a:rPr>
-              <a:t>texto</a:t>
+              <a:t>opci</a:t>
+            </a:r>
+            <a:r>
+              <a:rPr lang="es-ES" sz="1100" dirty="0" err="1" smtClean="0">
+                <a:solidFill>
+                  <a:srgbClr val="8D8D8D"/>
+                </a:solidFill>
+                <a:latin typeface="Tahoma" charset="0"/>
+                <a:ea typeface="Tahoma" charset="0"/>
+                <a:cs typeface="Tahoma" charset="0"/>
+              </a:rPr>
+              <a:t>ón</a:t>
+            </a:r>
+            <a:r>
+              <a:rPr lang="es-ES" sz="1100" dirty="0" smtClean="0">
+                <a:solidFill>
+                  <a:srgbClr val="8D8D8D"/>
+                </a:solidFill>
+                <a:latin typeface="Tahoma" charset="0"/>
+                <a:ea typeface="Tahoma" charset="0"/>
+                <a:cs typeface="Tahoma" charset="0"/>
+              </a:rPr>
+              <a:t> de “duplicar diapositiva”</a:t>
             </a:r>
             <a:endParaRPr lang="en-US" sz="1100" dirty="0">
               <a:solidFill>

</xml_diff>